<commit_message>
updating the dipnetWorkflow diagram
</commit_message>
<xml_diff>
--- a/src/main/web/docs/dipnetWorkflow.pptx
+++ b/src/main/web/docs/dipnetWorkflow.pptx
@@ -2972,7 +2972,7 @@
         </p:nvSpPr>
         <p:spPr>
           <a:xfrm>
-            <a:off x="529371" y="701188"/>
+            <a:off x="529371" y="1718458"/>
             <a:ext cx="1535723" cy="896814"/>
           </a:xfrm>
           <a:prstGeom prst="roundRect">
@@ -3023,7 +3023,7 @@
         </p:nvSpPr>
         <p:spPr>
           <a:xfrm>
-            <a:off x="2821231" y="701188"/>
+            <a:off x="2821231" y="1718458"/>
             <a:ext cx="1535723" cy="896815"/>
           </a:xfrm>
           <a:prstGeom prst="roundRect">
@@ -3065,8 +3065,8 @@
         </p:nvSpPr>
         <p:spPr>
           <a:xfrm>
-            <a:off x="5475591" y="1598002"/>
-            <a:ext cx="2215660" cy="896814"/>
+            <a:off x="5187362" y="2538337"/>
+            <a:ext cx="1839609" cy="896814"/>
           </a:xfrm>
           <a:prstGeom prst="roundRect">
             <a:avLst/>
@@ -3109,7 +3109,7 @@
         </p:nvSpPr>
         <p:spPr>
           <a:xfrm>
-            <a:off x="529370" y="2329954"/>
+            <a:off x="529370" y="3175774"/>
             <a:ext cx="1535723" cy="896815"/>
           </a:xfrm>
           <a:prstGeom prst="roundRect">
@@ -3145,55 +3145,13 @@
       </p:sp>
       <p:sp>
         <p:nvSpPr>
-          <p:cNvPr id="10" name="Rounded Rectangle 9"/>
-          <p:cNvSpPr/>
-          <p:nvPr/>
-        </p:nvSpPr>
-        <p:spPr>
-          <a:xfrm>
-            <a:off x="5418166" y="3178742"/>
-            <a:ext cx="2368609" cy="1832746"/>
-          </a:xfrm>
-          <a:prstGeom prst="roundRect">
-            <a:avLst/>
-          </a:prstGeom>
-        </p:spPr>
-        <p:style>
-          <a:lnRef idx="2">
-            <a:schemeClr val="accent6"/>
-          </a:lnRef>
-          <a:fillRef idx="1">
-            <a:schemeClr val="lt1"/>
-          </a:fillRef>
-          <a:effectRef idx="0">
-            <a:schemeClr val="accent6"/>
-          </a:effectRef>
-          <a:fontRef idx="minor">
-            <a:schemeClr val="dk1"/>
-          </a:fontRef>
-        </p:style>
-        <p:txBody>
-          <a:bodyPr rtlCol="0" anchor="ctr"/>
-          <a:lstStyle/>
-          <a:p>
-            <a:pPr algn="ctr"/>
-            <a:r>
-              <a:rPr lang="en-US" dirty="0" smtClean="0"/>
-              <a:t>Download expedition metadata + sequences(1) &amp; Further Quality Control &amp; Alignment, if required</a:t>
-            </a:r>
-            <a:endParaRPr lang="en-US" dirty="0"/>
-          </a:p>
-        </p:txBody>
-      </p:sp>
-      <p:sp>
-        <p:nvSpPr>
           <p:cNvPr id="11" name="Rounded Rectangle 10"/>
           <p:cNvSpPr/>
           <p:nvPr/>
         </p:nvSpPr>
         <p:spPr>
           <a:xfrm>
-            <a:off x="2821231" y="2329954"/>
+            <a:off x="2821231" y="3175774"/>
             <a:ext cx="1535723" cy="896815"/>
           </a:xfrm>
           <a:prstGeom prst="roundRect">
@@ -3235,84 +3193,6 @@
           </a:p>
         </p:txBody>
       </p:sp>
-      <p:sp>
-        <p:nvSpPr>
-          <p:cNvPr id="12" name="TextBox 11"/>
-          <p:cNvSpPr txBox="1"/>
-          <p:nvPr/>
-        </p:nvSpPr>
-        <p:spPr>
-          <a:xfrm>
-            <a:off x="368354" y="6198020"/>
-            <a:ext cx="5738813" cy="369332"/>
-          </a:xfrm>
-          <a:prstGeom prst="rect">
-            <a:avLst/>
-          </a:prstGeom>
-          <a:noFill/>
-        </p:spPr>
-        <p:txBody>
-          <a:bodyPr wrap="square" rtlCol="0">
-            <a:spAutoFit/>
-          </a:bodyPr>
-          <a:lstStyle/>
-          <a:p>
-            <a:pPr marL="342900" indent="-342900">
-              <a:buAutoNum type="arabicPeriod"/>
-            </a:pPr>
-            <a:r>
-              <a:rPr lang="en-US" dirty="0" smtClean="0"/>
-              <a:t>See: </a:t>
-            </a:r>
-            <a:r>
-              <a:rPr lang="en-US" dirty="0" smtClean="0">
-                <a:hlinkClick r:id="rId2"/>
-              </a:rPr>
-              <a:t>http://www.biscicol.org/dipnet/secure/expeditions</a:t>
-            </a:r>
-            <a:endParaRPr lang="en-US" dirty="0" smtClean="0"/>
-          </a:p>
-        </p:txBody>
-      </p:sp>
-      <p:cxnSp>
-        <p:nvCxnSpPr>
-          <p:cNvPr id="17" name="Curved Connector 16"/>
-          <p:cNvCxnSpPr>
-            <a:stCxn id="10" idx="1"/>
-            <a:endCxn id="7" idx="2"/>
-          </p:cNvCxnSpPr>
-          <p:nvPr/>
-        </p:nvCxnSpPr>
-        <p:spPr>
-          <a:xfrm rot="10800000">
-            <a:off x="1297232" y="3226769"/>
-            <a:ext cx="4120934" cy="868346"/>
-          </a:xfrm>
-          <a:prstGeom prst="curvedConnector2">
-            <a:avLst/>
-          </a:prstGeom>
-          <a:ln w="25400" cap="rnd">
-            <a:solidFill>
-              <a:schemeClr val="tx1"/>
-            </a:solidFill>
-            <a:tailEnd type="triangle" w="lg" len="lg"/>
-          </a:ln>
-        </p:spPr>
-        <p:style>
-          <a:lnRef idx="1">
-            <a:schemeClr val="accent1"/>
-          </a:lnRef>
-          <a:fillRef idx="0">
-            <a:schemeClr val="accent1"/>
-          </a:fillRef>
-          <a:effectRef idx="0">
-            <a:schemeClr val="accent1"/>
-          </a:effectRef>
-          <a:fontRef idx="minor">
-            <a:schemeClr val="tx1"/>
-          </a:fontRef>
-        </p:style>
-      </p:cxnSp>
       <p:cxnSp>
         <p:nvCxnSpPr>
           <p:cNvPr id="18" name="Curved Connector 17"/>
@@ -3324,7 +3204,7 @@
         </p:nvCxnSpPr>
         <p:spPr>
           <a:xfrm>
-            <a:off x="2065093" y="2778362"/>
+            <a:off x="2065093" y="3624182"/>
             <a:ext cx="756138" cy="12700"/>
           </a:xfrm>
           <a:prstGeom prst="curvedConnector3">
@@ -3365,49 +3245,8 @@
         </p:nvCxnSpPr>
         <p:spPr>
           <a:xfrm flipV="1">
-            <a:off x="4356954" y="2046409"/>
-            <a:ext cx="1118637" cy="731953"/>
-          </a:xfrm>
-          <a:prstGeom prst="curvedConnector3">
-            <a:avLst>
-              <a:gd name="adj1" fmla="val 50000"/>
-            </a:avLst>
-          </a:prstGeom>
-          <a:ln w="25400" cap="rnd">
-            <a:solidFill>
-              <a:schemeClr val="tx1"/>
-            </a:solidFill>
-            <a:tailEnd type="triangle" w="lg" len="lg"/>
-          </a:ln>
-        </p:spPr>
-        <p:style>
-          <a:lnRef idx="1">
-            <a:schemeClr val="accent1"/>
-          </a:lnRef>
-          <a:fillRef idx="0">
-            <a:schemeClr val="accent1"/>
-          </a:fillRef>
-          <a:effectRef idx="0">
-            <a:schemeClr val="accent1"/>
-          </a:effectRef>
-          <a:fontRef idx="minor">
-            <a:schemeClr val="tx1"/>
-          </a:fontRef>
-        </p:style>
-      </p:cxnSp>
-      <p:cxnSp>
-        <p:nvCxnSpPr>
-          <p:cNvPr id="24" name="Curved Connector 23"/>
-          <p:cNvCxnSpPr>
-            <a:stCxn id="6" idx="2"/>
-            <a:endCxn id="10" idx="0"/>
-          </p:cNvCxnSpPr>
-          <p:nvPr/>
-        </p:nvCxnSpPr>
-        <p:spPr>
-          <a:xfrm rot="16200000" flipH="1">
-            <a:off x="6250983" y="2827254"/>
-            <a:ext cx="683926" cy="19050"/>
+            <a:off x="4356954" y="2986744"/>
+            <a:ext cx="830408" cy="637438"/>
           </a:xfrm>
           <a:prstGeom prst="curvedConnector3">
             <a:avLst>
@@ -3447,8 +3286,8 @@
         </p:nvCxnSpPr>
         <p:spPr>
           <a:xfrm>
-            <a:off x="4356954" y="1149596"/>
-            <a:ext cx="1118637" cy="896813"/>
+            <a:off x="4356954" y="2166866"/>
+            <a:ext cx="830408" cy="819878"/>
           </a:xfrm>
           <a:prstGeom prst="curvedConnector3">
             <a:avLst>
@@ -3488,7 +3327,7 @@
         </p:nvCxnSpPr>
         <p:spPr>
           <a:xfrm>
-            <a:off x="2065094" y="1149595"/>
+            <a:off x="2065094" y="2166865"/>
             <a:ext cx="756137" cy="1"/>
           </a:xfrm>
           <a:prstGeom prst="curvedConnector3">
@@ -3526,8 +3365,8 @@
         </p:nvSpPr>
         <p:spPr>
           <a:xfrm>
-            <a:off x="8724900" y="1604352"/>
-            <a:ext cx="2286000" cy="896814"/>
+            <a:off x="9917718" y="2538337"/>
+            <a:ext cx="1929770" cy="896814"/>
           </a:xfrm>
           <a:prstGeom prst="roundRect">
             <a:avLst/>
@@ -3555,11 +3394,7 @@
           <a:p>
             <a:pPr algn="ctr"/>
             <a:r>
-              <a:rPr lang="en-US" dirty="0" smtClean="0"/>
-              <a:t>NCBI </a:t>
-            </a:r>
-            <a:r>
-              <a:rPr lang="en-US" dirty="0" err="1" smtClean="0"/>
+              <a:rPr lang="en-US" smtClean="0"/>
               <a:t>Genbank</a:t>
             </a:r>
             <a:r>
@@ -3578,8 +3413,8 @@
         </p:nvSpPr>
         <p:spPr>
           <a:xfrm>
-            <a:off x="368354" y="5479981"/>
-            <a:ext cx="2992138" cy="388141"/>
+            <a:off x="529370" y="5330562"/>
+            <a:ext cx="3496336" cy="381250"/>
           </a:xfrm>
           <a:prstGeom prst="roundRect">
             <a:avLst/>
@@ -3620,8 +3455,8 @@
         </p:nvSpPr>
         <p:spPr>
           <a:xfrm>
-            <a:off x="368354" y="4948546"/>
-            <a:ext cx="2992138" cy="404265"/>
+            <a:off x="529370" y="4780077"/>
+            <a:ext cx="3496336" cy="381250"/>
           </a:xfrm>
           <a:prstGeom prst="roundRect">
             <a:avLst/>
@@ -3649,6 +3484,10 @@
           <a:p>
             <a:pPr algn="ctr"/>
             <a:r>
+              <a:rPr lang="en-US" smtClean="0"/>
+              <a:t>User-level </a:t>
+            </a:r>
+            <a:r>
               <a:rPr lang="en-US" dirty="0" err="1" smtClean="0"/>
               <a:t>DIPnet</a:t>
             </a:r>
@@ -3665,14 +3504,14 @@
           <p:cNvPr id="44" name="Curved Connector 43"/>
           <p:cNvCxnSpPr>
             <a:stCxn id="6" idx="3"/>
-            <a:endCxn id="35" idx="1"/>
+            <a:endCxn id="96" idx="1"/>
           </p:cNvCxnSpPr>
           <p:nvPr/>
         </p:nvCxnSpPr>
         <p:spPr>
           <a:xfrm>
-            <a:off x="7691251" y="2046409"/>
-            <a:ext cx="1033649" cy="6350"/>
+            <a:off x="7026971" y="2986744"/>
+            <a:ext cx="525569" cy="12700"/>
           </a:xfrm>
           <a:prstGeom prst="curvedConnector3">
             <a:avLst>
@@ -3709,7 +3548,7 @@
         </p:nvSpPr>
         <p:spPr>
           <a:xfrm>
-            <a:off x="5816406" y="340453"/>
+            <a:off x="4025706" y="704722"/>
             <a:ext cx="3893374" cy="584775"/>
           </a:xfrm>
           <a:prstGeom prst="rect">
@@ -3738,6 +3577,157 @@
             <a:endParaRPr lang="en-US" sz="3200" b="1" dirty="0">
               <a:latin typeface="+mj-lt"/>
             </a:endParaRPr>
+          </a:p>
+        </p:txBody>
+      </p:sp>
+      <p:sp>
+        <p:nvSpPr>
+          <p:cNvPr id="96" name="Rounded Rectangle 95"/>
+          <p:cNvSpPr/>
+          <p:nvPr/>
+        </p:nvSpPr>
+        <p:spPr>
+          <a:xfrm>
+            <a:off x="7552540" y="2538337"/>
+            <a:ext cx="1839609" cy="896814"/>
+          </a:xfrm>
+          <a:prstGeom prst="roundRect">
+            <a:avLst/>
+          </a:prstGeom>
+        </p:spPr>
+        <p:style>
+          <a:lnRef idx="2">
+            <a:schemeClr val="accent2">
+              <a:shade val="50000"/>
+            </a:schemeClr>
+          </a:lnRef>
+          <a:fillRef idx="1">
+            <a:schemeClr val="accent2"/>
+          </a:fillRef>
+          <a:effectRef idx="0">
+            <a:schemeClr val="accent2"/>
+          </a:effectRef>
+          <a:fontRef idx="minor">
+            <a:schemeClr val="lt1"/>
+          </a:fontRef>
+        </p:style>
+        <p:txBody>
+          <a:bodyPr rtlCol="0" anchor="ctr"/>
+          <a:lstStyle/>
+          <a:p>
+            <a:pPr algn="ctr"/>
+            <a:r>
+              <a:rPr lang="en-US" dirty="0" smtClean="0"/>
+              <a:t>Data Curation</a:t>
+            </a:r>
+          </a:p>
+          <a:p>
+            <a:pPr algn="ctr"/>
+            <a:r>
+              <a:rPr lang="en-US" dirty="0" smtClean="0"/>
+              <a:t>By </a:t>
+            </a:r>
+          </a:p>
+          <a:p>
+            <a:pPr algn="ctr"/>
+            <a:r>
+              <a:rPr lang="en-US" dirty="0" smtClean="0"/>
+              <a:t>Administrator</a:t>
+            </a:r>
+            <a:endParaRPr lang="en-US" dirty="0"/>
+          </a:p>
+        </p:txBody>
+      </p:sp>
+      <p:cxnSp>
+        <p:nvCxnSpPr>
+          <p:cNvPr id="102" name="Curved Connector 101"/>
+          <p:cNvCxnSpPr>
+            <a:stCxn id="96" idx="3"/>
+            <a:endCxn id="35" idx="1"/>
+          </p:cNvCxnSpPr>
+          <p:nvPr/>
+        </p:nvCxnSpPr>
+        <p:spPr>
+          <a:xfrm>
+            <a:off x="9392149" y="2986744"/>
+            <a:ext cx="525569" cy="12700"/>
+          </a:xfrm>
+          <a:prstGeom prst="curvedConnector3">
+            <a:avLst>
+              <a:gd name="adj1" fmla="val 50000"/>
+            </a:avLst>
+          </a:prstGeom>
+          <a:ln w="25400" cap="rnd">
+            <a:solidFill>
+              <a:schemeClr val="tx1"/>
+            </a:solidFill>
+            <a:tailEnd type="triangle" w="lg" len="lg"/>
+          </a:ln>
+        </p:spPr>
+        <p:style>
+          <a:lnRef idx="1">
+            <a:schemeClr val="accent1"/>
+          </a:lnRef>
+          <a:fillRef idx="0">
+            <a:schemeClr val="accent1"/>
+          </a:fillRef>
+          <a:effectRef idx="0">
+            <a:schemeClr val="accent1"/>
+          </a:effectRef>
+          <a:fontRef idx="minor">
+            <a:schemeClr val="tx1"/>
+          </a:fontRef>
+        </p:style>
+      </p:cxnSp>
+      <p:sp>
+        <p:nvSpPr>
+          <p:cNvPr id="105" name="Rounded Rectangle 104"/>
+          <p:cNvSpPr/>
+          <p:nvPr/>
+        </p:nvSpPr>
+        <p:spPr>
+          <a:xfrm>
+            <a:off x="529370" y="5881047"/>
+            <a:ext cx="3496336" cy="381250"/>
+          </a:xfrm>
+          <a:prstGeom prst="roundRect">
+            <a:avLst/>
+          </a:prstGeom>
+        </p:spPr>
+        <p:style>
+          <a:lnRef idx="2">
+            <a:schemeClr val="accent2">
+              <a:shade val="50000"/>
+            </a:schemeClr>
+          </a:lnRef>
+          <a:fillRef idx="1">
+            <a:schemeClr val="accent2"/>
+          </a:fillRef>
+          <a:effectRef idx="0">
+            <a:schemeClr val="accent2"/>
+          </a:effectRef>
+          <a:fontRef idx="minor">
+            <a:schemeClr val="lt1"/>
+          </a:fontRef>
+        </p:style>
+        <p:txBody>
+          <a:bodyPr rtlCol="0" anchor="ctr"/>
+          <a:lstStyle/>
+          <a:p>
+            <a:pPr algn="ctr"/>
+            <a:r>
+              <a:rPr lang="en-US" dirty="0" smtClean="0"/>
+              <a:t>Admin-level </a:t>
+            </a:r>
+            <a:r>
+              <a:rPr lang="en-US" dirty="0" err="1" smtClean="0"/>
+              <a:t>DIPnet</a:t>
+            </a:r>
+            <a:r>
+              <a:rPr lang="en-US" dirty="0" smtClean="0"/>
+              <a:t> FIMS Functions</a:t>
+            </a:r>
+            <a:endParaRPr lang="en-US" dirty="0"/>
           </a:p>
         </p:txBody>
       </p:sp>

</xml_diff>

<commit_message>
modifying dipnet splash image
</commit_message>
<xml_diff>
--- a/src/main/web/docs/dipnetWorkflow.pptx
+++ b/src/main/web/docs/dipnetWorkflow.pptx
@@ -104,6 +104,11 @@
       </a:defRPr>
     </a:lvl9pPr>
   </p:defaultTextStyle>
+  <p:extLst>
+    <p:ext uri="{EFAFB233-063F-42B5-8137-9DF3F51BA10A}">
+      <p15:sldGuideLst xmlns:p15="http://schemas.microsoft.com/office/powerpoint/2012/main"/>
+    </p:ext>
+  </p:extLst>
 </p:presentation>
 </file>
 
@@ -238,7 +243,7 @@
           <a:p>
             <a:fld id="{FF6C7326-2AF8-734F-A684-D3076EFEC837}" type="datetimeFigureOut">
               <a:rPr lang="en-US" smtClean="0"/>
-              <a:t>4/15/16</a:t>
+              <a:t>10/26/16</a:t>
             </a:fld>
             <a:endParaRPr lang="en-US"/>
           </a:p>
@@ -408,7 +413,7 @@
           <a:p>
             <a:fld id="{FF6C7326-2AF8-734F-A684-D3076EFEC837}" type="datetimeFigureOut">
               <a:rPr lang="en-US" smtClean="0"/>
-              <a:t>4/15/16</a:t>
+              <a:t>10/26/16</a:t>
             </a:fld>
             <a:endParaRPr lang="en-US"/>
           </a:p>
@@ -588,7 +593,7 @@
           <a:p>
             <a:fld id="{FF6C7326-2AF8-734F-A684-D3076EFEC837}" type="datetimeFigureOut">
               <a:rPr lang="en-US" smtClean="0"/>
-              <a:t>4/15/16</a:t>
+              <a:t>10/26/16</a:t>
             </a:fld>
             <a:endParaRPr lang="en-US"/>
           </a:p>
@@ -758,7 +763,7 @@
           <a:p>
             <a:fld id="{FF6C7326-2AF8-734F-A684-D3076EFEC837}" type="datetimeFigureOut">
               <a:rPr lang="en-US" smtClean="0"/>
-              <a:t>4/15/16</a:t>
+              <a:t>10/26/16</a:t>
             </a:fld>
             <a:endParaRPr lang="en-US"/>
           </a:p>
@@ -1004,7 +1009,7 @@
           <a:p>
             <a:fld id="{FF6C7326-2AF8-734F-A684-D3076EFEC837}" type="datetimeFigureOut">
               <a:rPr lang="en-US" smtClean="0"/>
-              <a:t>4/15/16</a:t>
+              <a:t>10/26/16</a:t>
             </a:fld>
             <a:endParaRPr lang="en-US"/>
           </a:p>
@@ -1236,7 +1241,7 @@
           <a:p>
             <a:fld id="{FF6C7326-2AF8-734F-A684-D3076EFEC837}" type="datetimeFigureOut">
               <a:rPr lang="en-US" smtClean="0"/>
-              <a:t>4/15/16</a:t>
+              <a:t>10/26/16</a:t>
             </a:fld>
             <a:endParaRPr lang="en-US"/>
           </a:p>
@@ -1603,7 +1608,7 @@
           <a:p>
             <a:fld id="{FF6C7326-2AF8-734F-A684-D3076EFEC837}" type="datetimeFigureOut">
               <a:rPr lang="en-US" smtClean="0"/>
-              <a:t>4/15/16</a:t>
+              <a:t>10/26/16</a:t>
             </a:fld>
             <a:endParaRPr lang="en-US"/>
           </a:p>
@@ -1721,7 +1726,7 @@
           <a:p>
             <a:fld id="{FF6C7326-2AF8-734F-A684-D3076EFEC837}" type="datetimeFigureOut">
               <a:rPr lang="en-US" smtClean="0"/>
-              <a:t>4/15/16</a:t>
+              <a:t>10/26/16</a:t>
             </a:fld>
             <a:endParaRPr lang="en-US"/>
           </a:p>
@@ -1816,7 +1821,7 @@
           <a:p>
             <a:fld id="{FF6C7326-2AF8-734F-A684-D3076EFEC837}" type="datetimeFigureOut">
               <a:rPr lang="en-US" smtClean="0"/>
-              <a:t>4/15/16</a:t>
+              <a:t>10/26/16</a:t>
             </a:fld>
             <a:endParaRPr lang="en-US"/>
           </a:p>
@@ -2093,7 +2098,7 @@
           <a:p>
             <a:fld id="{FF6C7326-2AF8-734F-A684-D3076EFEC837}" type="datetimeFigureOut">
               <a:rPr lang="en-US" smtClean="0"/>
-              <a:t>4/15/16</a:t>
+              <a:t>10/26/16</a:t>
             </a:fld>
             <a:endParaRPr lang="en-US"/>
           </a:p>
@@ -2346,7 +2351,7 @@
           <a:p>
             <a:fld id="{FF6C7326-2AF8-734F-A684-D3076EFEC837}" type="datetimeFigureOut">
               <a:rPr lang="en-US" smtClean="0"/>
-              <a:t>4/15/16</a:t>
+              <a:t>10/26/16</a:t>
             </a:fld>
             <a:endParaRPr lang="en-US"/>
           </a:p>
@@ -2559,7 +2564,7 @@
           <a:p>
             <a:fld id="{FF6C7326-2AF8-734F-A684-D3076EFEC837}" type="datetimeFigureOut">
               <a:rPr lang="en-US" smtClean="0"/>
-              <a:t>4/15/16</a:t>
+              <a:t>10/26/16</a:t>
             </a:fld>
             <a:endParaRPr lang="en-US"/>
           </a:p>
@@ -3394,12 +3399,15 @@
           <a:p>
             <a:pPr algn="ctr"/>
             <a:r>
-              <a:rPr lang="en-US" smtClean="0"/>
-              <a:t>Genbank</a:t>
-            </a:r>
-            <a:r>
               <a:rPr lang="en-US" dirty="0" smtClean="0"/>
-              <a:t> Linker</a:t>
+              <a:t>Sequence Read Archive submit</a:t>
+            </a:r>
+          </a:p>
+          <a:p>
+            <a:pPr algn="ctr"/>
+            <a:r>
+              <a:rPr lang="en-US" dirty="0" smtClean="0"/>
+              <a:t>(in progress)</a:t>
             </a:r>
             <a:endParaRPr lang="en-US" dirty="0"/>
           </a:p>
@@ -3511,7 +3519,7 @@
         <p:spPr>
           <a:xfrm>
             <a:off x="7026971" y="2986744"/>
-            <a:ext cx="525569" cy="12700"/>
+            <a:ext cx="525569" cy="3586"/>
           </a:xfrm>
           <a:prstGeom prst="curvedConnector3">
             <a:avLst>
@@ -3588,7 +3596,7 @@
         </p:nvSpPr>
         <p:spPr>
           <a:xfrm>
-            <a:off x="7552540" y="2538337"/>
+            <a:off x="7552540" y="2541923"/>
             <a:ext cx="1839609" cy="896814"/>
           </a:xfrm>
           <a:prstGeom prst="roundRect">
@@ -3648,9 +3656,9 @@
           <p:nvPr/>
         </p:nvCxnSpPr>
         <p:spPr>
-          <a:xfrm>
+          <a:xfrm flipV="1">
             <a:off x="9392149" y="2986744"/>
-            <a:ext cx="525569" cy="12700"/>
+            <a:ext cx="525569" cy="3586"/>
           </a:xfrm>
           <a:prstGeom prst="curvedConnector3">
             <a:avLst>
@@ -3731,6 +3739,91 @@
           </a:p>
         </p:txBody>
       </p:sp>
+      <p:sp>
+        <p:nvSpPr>
+          <p:cNvPr id="22" name="Rounded Rectangle 21"/>
+          <p:cNvSpPr/>
+          <p:nvPr/>
+        </p:nvSpPr>
+        <p:spPr>
+          <a:xfrm>
+            <a:off x="7501410" y="4331670"/>
+            <a:ext cx="1929770" cy="896814"/>
+          </a:xfrm>
+          <a:prstGeom prst="roundRect">
+            <a:avLst/>
+          </a:prstGeom>
+        </p:spPr>
+        <p:style>
+          <a:lnRef idx="2">
+            <a:schemeClr val="accent1">
+              <a:shade val="50000"/>
+            </a:schemeClr>
+          </a:lnRef>
+          <a:fillRef idx="1">
+            <a:schemeClr val="accent1"/>
+          </a:fillRef>
+          <a:effectRef idx="0">
+            <a:schemeClr val="accent1"/>
+          </a:effectRef>
+          <a:fontRef idx="minor">
+            <a:schemeClr val="lt1"/>
+          </a:fontRef>
+        </p:style>
+        <p:txBody>
+          <a:bodyPr rtlCol="0" anchor="ctr"/>
+          <a:lstStyle/>
+          <a:p>
+            <a:pPr algn="ctr"/>
+            <a:r>
+              <a:rPr lang="en-US" dirty="0" smtClean="0"/>
+              <a:t>GBIF/Integrated Publishing Toolkit (in progress)</a:t>
+            </a:r>
+            <a:endParaRPr lang="en-US" dirty="0"/>
+          </a:p>
+        </p:txBody>
+      </p:sp>
+      <p:cxnSp>
+        <p:nvCxnSpPr>
+          <p:cNvPr id="23" name="Curved Connector 22"/>
+          <p:cNvCxnSpPr>
+            <a:stCxn id="96" idx="2"/>
+            <a:endCxn id="22" idx="0"/>
+          </p:cNvCxnSpPr>
+          <p:nvPr/>
+        </p:nvCxnSpPr>
+        <p:spPr>
+          <a:xfrm rot="5400000">
+            <a:off x="8022854" y="3882178"/>
+            <a:ext cx="892933" cy="6050"/>
+          </a:xfrm>
+          <a:prstGeom prst="curvedConnector3">
+            <a:avLst>
+              <a:gd name="adj1" fmla="val 50000"/>
+            </a:avLst>
+          </a:prstGeom>
+          <a:ln w="25400" cap="rnd">
+            <a:solidFill>
+              <a:schemeClr val="tx1"/>
+            </a:solidFill>
+            <a:tailEnd type="triangle" w="lg" len="lg"/>
+          </a:ln>
+        </p:spPr>
+        <p:style>
+          <a:lnRef idx="1">
+            <a:schemeClr val="accent1"/>
+          </a:lnRef>
+          <a:fillRef idx="0">
+            <a:schemeClr val="accent1"/>
+          </a:fillRef>
+          <a:effectRef idx="0">
+            <a:schemeClr val="accent1"/>
+          </a:effectRef>
+          <a:fontRef idx="minor">
+            <a:schemeClr val="tx1"/>
+          </a:fontRef>
+        </p:style>
+      </p:cxnSp>
     </p:spTree>
     <p:extLst>
       <p:ext uri="{BB962C8B-B14F-4D97-AF65-F5344CB8AC3E}">

</xml_diff>

<commit_message>
modified homepage workflow img
</commit_message>
<xml_diff>
--- a/src/main/web/docs/dipnetWorkflow.pptx
+++ b/src/main/web/docs/dipnetWorkflow.pptx
@@ -243,7 +243,7 @@
           <a:p>
             <a:fld id="{FF6C7326-2AF8-734F-A684-D3076EFEC837}" type="datetimeFigureOut">
               <a:rPr lang="en-US" smtClean="0"/>
-              <a:t>10/26/16</a:t>
+              <a:t>10/28/16</a:t>
             </a:fld>
             <a:endParaRPr lang="en-US"/>
           </a:p>
@@ -413,7 +413,7 @@
           <a:p>
             <a:fld id="{FF6C7326-2AF8-734F-A684-D3076EFEC837}" type="datetimeFigureOut">
               <a:rPr lang="en-US" smtClean="0"/>
-              <a:t>10/26/16</a:t>
+              <a:t>10/28/16</a:t>
             </a:fld>
             <a:endParaRPr lang="en-US"/>
           </a:p>
@@ -593,7 +593,7 @@
           <a:p>
             <a:fld id="{FF6C7326-2AF8-734F-A684-D3076EFEC837}" type="datetimeFigureOut">
               <a:rPr lang="en-US" smtClean="0"/>
-              <a:t>10/26/16</a:t>
+              <a:t>10/28/16</a:t>
             </a:fld>
             <a:endParaRPr lang="en-US"/>
           </a:p>
@@ -763,7 +763,7 @@
           <a:p>
             <a:fld id="{FF6C7326-2AF8-734F-A684-D3076EFEC837}" type="datetimeFigureOut">
               <a:rPr lang="en-US" smtClean="0"/>
-              <a:t>10/26/16</a:t>
+              <a:t>10/28/16</a:t>
             </a:fld>
             <a:endParaRPr lang="en-US"/>
           </a:p>
@@ -1009,7 +1009,7 @@
           <a:p>
             <a:fld id="{FF6C7326-2AF8-734F-A684-D3076EFEC837}" type="datetimeFigureOut">
               <a:rPr lang="en-US" smtClean="0"/>
-              <a:t>10/26/16</a:t>
+              <a:t>10/28/16</a:t>
             </a:fld>
             <a:endParaRPr lang="en-US"/>
           </a:p>
@@ -1241,7 +1241,7 @@
           <a:p>
             <a:fld id="{FF6C7326-2AF8-734F-A684-D3076EFEC837}" type="datetimeFigureOut">
               <a:rPr lang="en-US" smtClean="0"/>
-              <a:t>10/26/16</a:t>
+              <a:t>10/28/16</a:t>
             </a:fld>
             <a:endParaRPr lang="en-US"/>
           </a:p>
@@ -1608,7 +1608,7 @@
           <a:p>
             <a:fld id="{FF6C7326-2AF8-734F-A684-D3076EFEC837}" type="datetimeFigureOut">
               <a:rPr lang="en-US" smtClean="0"/>
-              <a:t>10/26/16</a:t>
+              <a:t>10/28/16</a:t>
             </a:fld>
             <a:endParaRPr lang="en-US"/>
           </a:p>
@@ -1726,7 +1726,7 @@
           <a:p>
             <a:fld id="{FF6C7326-2AF8-734F-A684-D3076EFEC837}" type="datetimeFigureOut">
               <a:rPr lang="en-US" smtClean="0"/>
-              <a:t>10/26/16</a:t>
+              <a:t>10/28/16</a:t>
             </a:fld>
             <a:endParaRPr lang="en-US"/>
           </a:p>
@@ -1821,7 +1821,7 @@
           <a:p>
             <a:fld id="{FF6C7326-2AF8-734F-A684-D3076EFEC837}" type="datetimeFigureOut">
               <a:rPr lang="en-US" smtClean="0"/>
-              <a:t>10/26/16</a:t>
+              <a:t>10/28/16</a:t>
             </a:fld>
             <a:endParaRPr lang="en-US"/>
           </a:p>
@@ -2098,7 +2098,7 @@
           <a:p>
             <a:fld id="{FF6C7326-2AF8-734F-A684-D3076EFEC837}" type="datetimeFigureOut">
               <a:rPr lang="en-US" smtClean="0"/>
-              <a:t>10/26/16</a:t>
+              <a:t>10/28/16</a:t>
             </a:fld>
             <a:endParaRPr lang="en-US"/>
           </a:p>
@@ -2351,7 +2351,7 @@
           <a:p>
             <a:fld id="{FF6C7326-2AF8-734F-A684-D3076EFEC837}" type="datetimeFigureOut">
               <a:rPr lang="en-US" smtClean="0"/>
-              <a:t>10/26/16</a:t>
+              <a:t>10/28/16</a:t>
             </a:fld>
             <a:endParaRPr lang="en-US"/>
           </a:p>
@@ -2564,7 +2564,7 @@
           <a:p>
             <a:fld id="{FF6C7326-2AF8-734F-A684-D3076EFEC837}" type="datetimeFigureOut">
               <a:rPr lang="en-US" smtClean="0"/>
-              <a:t>10/26/16</a:t>
+              <a:t>10/28/16</a:t>
             </a:fld>
             <a:endParaRPr lang="en-US"/>
           </a:p>
@@ -3028,8 +3028,8 @@
         </p:nvSpPr>
         <p:spPr>
           <a:xfrm>
-            <a:off x="2821231" y="1718458"/>
-            <a:ext cx="1535723" cy="896815"/>
+            <a:off x="2702859" y="1718458"/>
+            <a:ext cx="1654095" cy="896815"/>
           </a:xfrm>
           <a:prstGeom prst="roundRect">
             <a:avLst/>
@@ -3114,8 +3114,8 @@
         </p:nvSpPr>
         <p:spPr>
           <a:xfrm>
-            <a:off x="529370" y="3175774"/>
-            <a:ext cx="1535723" cy="896815"/>
+            <a:off x="2702859" y="3175774"/>
+            <a:ext cx="1654095" cy="896815"/>
           </a:xfrm>
           <a:prstGeom prst="roundRect">
             <a:avLst/>
@@ -3142,108 +3142,32 @@
             <a:pPr algn="ctr"/>
             <a:r>
               <a:rPr lang="en-US" dirty="0" smtClean="0"/>
-              <a:t>Sequence Files</a:t>
+              <a:t>Sequence Files in </a:t>
+            </a:r>
+            <a:r>
+              <a:rPr lang="en-US" dirty="0" err="1" smtClean="0"/>
+              <a:t>fasta</a:t>
+            </a:r>
+            <a:r>
+              <a:rPr lang="en-US" dirty="0" smtClean="0"/>
+              <a:t> or </a:t>
+            </a:r>
+            <a:r>
+              <a:rPr lang="en-US" dirty="0" err="1" smtClean="0"/>
+              <a:t>fastq</a:t>
+            </a:r>
+            <a:r>
+              <a:rPr lang="en-US" dirty="0" smtClean="0"/>
+              <a:t> format</a:t>
             </a:r>
             <a:endParaRPr lang="en-US" dirty="0"/>
           </a:p>
         </p:txBody>
       </p:sp>
-      <p:sp>
-        <p:nvSpPr>
-          <p:cNvPr id="11" name="Rounded Rectangle 10"/>
-          <p:cNvSpPr/>
-          <p:nvPr/>
-        </p:nvSpPr>
-        <p:spPr>
-          <a:xfrm>
-            <a:off x="2821231" y="3175774"/>
-            <a:ext cx="1535723" cy="896815"/>
-          </a:xfrm>
-          <a:prstGeom prst="roundRect">
-            <a:avLst/>
-          </a:prstGeom>
-        </p:spPr>
-        <p:style>
-          <a:lnRef idx="2">
-            <a:schemeClr val="accent6"/>
-          </a:lnRef>
-          <a:fillRef idx="1">
-            <a:schemeClr val="lt1"/>
-          </a:fillRef>
-          <a:effectRef idx="0">
-            <a:schemeClr val="accent6"/>
-          </a:effectRef>
-          <a:fontRef idx="minor">
-            <a:schemeClr val="dk1"/>
-          </a:fontRef>
-        </p:style>
-        <p:txBody>
-          <a:bodyPr rtlCol="0" anchor="ctr"/>
-          <a:lstStyle/>
-          <a:p>
-            <a:pPr algn="ctr"/>
-            <a:r>
-              <a:rPr lang="en-US" dirty="0" smtClean="0"/>
-              <a:t>Convert to FASTA (</a:t>
-            </a:r>
-            <a:r>
-              <a:rPr lang="en-US" dirty="0" err="1" smtClean="0"/>
-              <a:t>PGDSpider</a:t>
-            </a:r>
-            <a:r>
-              <a:rPr lang="en-US" dirty="0" smtClean="0"/>
-              <a:t>)</a:t>
-            </a:r>
-            <a:endParaRPr lang="en-US" dirty="0"/>
-          </a:p>
-        </p:txBody>
-      </p:sp>
-      <p:cxnSp>
-        <p:nvCxnSpPr>
-          <p:cNvPr id="18" name="Curved Connector 17"/>
-          <p:cNvCxnSpPr>
-            <a:stCxn id="7" idx="3"/>
-            <a:endCxn id="11" idx="1"/>
-          </p:cNvCxnSpPr>
-          <p:nvPr/>
-        </p:nvCxnSpPr>
-        <p:spPr>
-          <a:xfrm>
-            <a:off x="2065093" y="3624182"/>
-            <a:ext cx="756138" cy="12700"/>
-          </a:xfrm>
-          <a:prstGeom prst="curvedConnector3">
-            <a:avLst>
-              <a:gd name="adj1" fmla="val 50000"/>
-            </a:avLst>
-          </a:prstGeom>
-          <a:ln w="25400" cap="rnd">
-            <a:solidFill>
-              <a:schemeClr val="tx1"/>
-            </a:solidFill>
-            <a:tailEnd type="triangle" w="lg" len="lg"/>
-          </a:ln>
-        </p:spPr>
-        <p:style>
-          <a:lnRef idx="1">
-            <a:schemeClr val="accent1"/>
-          </a:lnRef>
-          <a:fillRef idx="0">
-            <a:schemeClr val="accent1"/>
-          </a:fillRef>
-          <a:effectRef idx="0">
-            <a:schemeClr val="accent1"/>
-          </a:effectRef>
-          <a:fontRef idx="minor">
-            <a:schemeClr val="tx1"/>
-          </a:fontRef>
-        </p:style>
-      </p:cxnSp>
       <p:cxnSp>
         <p:nvCxnSpPr>
           <p:cNvPr id="21" name="Curved Connector 20"/>
           <p:cNvCxnSpPr>
-            <a:stCxn id="11" idx="3"/>
             <a:endCxn id="6" idx="1"/>
           </p:cNvCxnSpPr>
           <p:nvPr/>
@@ -3333,7 +3257,7 @@
         <p:spPr>
           <a:xfrm>
             <a:off x="2065094" y="2166865"/>
-            <a:ext cx="756137" cy="1"/>
+            <a:ext cx="637765" cy="1"/>
           </a:xfrm>
           <a:prstGeom prst="curvedConnector3">
             <a:avLst>

</xml_diff>